<commit_message>
detaily, edit prezentace a loga
</commit_message>
<xml_diff>
--- a/VSÚKHK - prezentace.pptx
+++ b/VSÚKHK - prezentace.pptx
@@ -8,11 +8,11 @@
     <p:sldId id="256" r:id="rId2"/>
     <p:sldId id="257" r:id="rId3"/>
     <p:sldId id="258" r:id="rId4"/>
-    <p:sldId id="259" r:id="rId5"/>
-    <p:sldId id="260" r:id="rId6"/>
-    <p:sldId id="262" r:id="rId7"/>
-    <p:sldId id="263" r:id="rId8"/>
-    <p:sldId id="261" r:id="rId9"/>
+    <p:sldId id="260" r:id="rId5"/>
+    <p:sldId id="262" r:id="rId6"/>
+    <p:sldId id="263" r:id="rId7"/>
+    <p:sldId id="261" r:id="rId8"/>
+    <p:sldId id="265" r:id="rId9"/>
     <p:sldId id="264" r:id="rId10"/>
   </p:sldIdLst>
   <p:sldSz cx="12192000" cy="6858000"/>
@@ -112,6 +112,11 @@
       </a:defRPr>
     </a:lvl9pPr>
   </p:defaultTextStyle>
+  <p:extLst>
+    <p:ext uri="{EFAFB233-063F-42B5-8137-9DF3F51BA10A}">
+      <p15:sldGuideLst xmlns:p15="http://schemas.microsoft.com/office/powerpoint/2012/main"/>
+    </p:ext>
+  </p:extLst>
 </p:presentation>
 </file>
 
@@ -3508,7 +3513,7 @@
             </a:pPr>
             <a:r>
               <a:rPr lang="cs-CZ" dirty="0"/>
-              <a:t>Uživatel chce podporovat veřejné sbírky ve svém okolí, chce podpořit opravu památek ve městě kde žije, uvítá to, že při cestě po svém městě uvidí památky, které částečně zafinancoval, pomůže postiženým dětem nebo azylovým domům.</a:t>
+              <a:t>Uživatel chce podporovat veřejné sbírky ve svém okolí, chce podpořit opravu památek ve městě kde žije, uvítá to, že při cestě po svém městě uvidí památky, které částečně zafinancoval, pomůže postiženým dětem nebo azylovým domům ve svém okolí.</a:t>
             </a:r>
           </a:p>
           <a:p>
@@ -3596,7 +3601,12 @@
             <p:ph idx="1"/>
           </p:nvPr>
         </p:nvSpPr>
-        <p:spPr/>
+        <p:spPr>
+          <a:xfrm>
+            <a:off x="838201" y="1871989"/>
+            <a:ext cx="10515599" cy="4620885"/>
+          </a:xfrm>
+        </p:spPr>
         <p:txBody>
           <a:bodyPr/>
           <a:lstStyle/>
@@ -3631,6 +3641,12 @@
             <a:r>
               <a:rPr lang="cs-CZ" dirty="0"/>
               <a:t>Zaměření sbírky</a:t>
+            </a:r>
+          </a:p>
+          <a:p>
+            <a:r>
+              <a:rPr lang="cs-CZ" dirty="0"/>
+              <a:t>Mapa umožňující zobrazit sbírky z daného místa</a:t>
             </a:r>
           </a:p>
         </p:txBody>
@@ -3670,7 +3686,7 @@
           <p:cNvPr id="2" name="Nadpis 1">
             <a:extLst>
               <a:ext uri="{FF2B5EF4-FFF2-40B4-BE49-F238E27FC236}">
-                <a16:creationId xmlns:a16="http://schemas.microsoft.com/office/drawing/2014/main" id="{D5DE48B0-7F11-4D63-9FDB-90270BA32B05}"/>
+                <a16:creationId xmlns:a16="http://schemas.microsoft.com/office/drawing/2014/main" id="{50ECDE1F-6333-4C77-9027-F9297C6D3834}"/>
               </a:ext>
             </a:extLst>
           </p:cNvPr>
@@ -3688,7 +3704,7 @@
           <a:p>
             <a:r>
               <a:rPr lang="cs-CZ" b="1" dirty="0"/>
-              <a:t>Využití</a:t>
+              <a:t>Základní popis funkčnosti</a:t>
             </a:r>
           </a:p>
         </p:txBody>
@@ -3698,7 +3714,7 @@
           <p:cNvPr id="3" name="Zástupný obsah 2">
             <a:extLst>
               <a:ext uri="{FF2B5EF4-FFF2-40B4-BE49-F238E27FC236}">
-                <a16:creationId xmlns:a16="http://schemas.microsoft.com/office/drawing/2014/main" id="{3F2857BC-0D18-4A29-BE3B-1D8802CC803F}"/>
+                <a16:creationId xmlns:a16="http://schemas.microsoft.com/office/drawing/2014/main" id="{0208540D-B274-4022-8263-133F9FF1F63E}"/>
               </a:ext>
             </a:extLst>
           </p:cNvPr>
@@ -3714,14 +3730,31 @@
           <a:bodyPr/>
           <a:lstStyle/>
           <a:p>
-            <a:endParaRPr lang="cs-CZ" dirty="0"/>
+            <a:r>
+              <a:rPr lang="cs-CZ" dirty="0"/>
+              <a:t>Na stránce se nachází mapa, uživatel klikne na město kde chce podpořit nějaké sbírky, na </a:t>
+            </a:r>
+            <a:r>
+              <a:rPr lang="cs-CZ" dirty="0" err="1"/>
+              <a:t>slideru</a:t>
+            </a:r>
+            <a:r>
+              <a:rPr lang="cs-CZ" dirty="0"/>
+              <a:t> si určí rozptyl – vzdálenost od bodu který označil – zobrazí se mu informace o veřejných sbírkách v tomto rozptylu (na základě místa, které uvedl zřizovatel té sbírky).</a:t>
+            </a:r>
+          </a:p>
+          <a:p>
+            <a:r>
+              <a:rPr lang="cs-CZ" dirty="0"/>
+              <a:t>Ten si vybere do které sbírky chce investovat, provede platbu na číslo účtu které se mu zobrazí v té tabulce. Tabulku může kdykoli zavřít pomocí tlačítka umístěného ve spodní části stránky.</a:t>
+            </a:r>
           </a:p>
         </p:txBody>
       </p:sp>
     </p:spTree>
     <p:extLst>
       <p:ext uri="{BB962C8B-B14F-4D97-AF65-F5344CB8AC3E}">
-        <p14:creationId xmlns:p14="http://schemas.microsoft.com/office/powerpoint/2010/main" val="3221426875"/>
+        <p14:creationId xmlns:p14="http://schemas.microsoft.com/office/powerpoint/2010/main" val="1991961192"/>
       </p:ext>
     </p:extLst>
   </p:cSld>
@@ -3753,7 +3786,7 @@
           <p:cNvPr id="2" name="Nadpis 1">
             <a:extLst>
               <a:ext uri="{FF2B5EF4-FFF2-40B4-BE49-F238E27FC236}">
-                <a16:creationId xmlns:a16="http://schemas.microsoft.com/office/drawing/2014/main" id="{50ECDE1F-6333-4C77-9027-F9297C6D3834}"/>
+                <a16:creationId xmlns:a16="http://schemas.microsoft.com/office/drawing/2014/main" id="{0CE56654-10A3-462F-8D16-39E6E70BBCF4}"/>
               </a:ext>
             </a:extLst>
           </p:cNvPr>
@@ -3771,7 +3804,7 @@
           <a:p>
             <a:r>
               <a:rPr lang="cs-CZ" b="1" dirty="0"/>
-              <a:t>Základní popis funkčnosti</a:t>
+              <a:t>Co jsme chtěli udělat a nestihli jsme to?</a:t>
             </a:r>
           </a:p>
         </p:txBody>
@@ -3781,15 +3814,15 @@
           <p:cNvPr id="3" name="Zástupný obsah 2">
             <a:extLst>
               <a:ext uri="{FF2B5EF4-FFF2-40B4-BE49-F238E27FC236}">
-                <a16:creationId xmlns:a16="http://schemas.microsoft.com/office/drawing/2014/main" id="{0208540D-B274-4022-8263-133F9FF1F63E}"/>
-              </a:ext>
-            </a:extLst>
-          </p:cNvPr>
-          <p:cNvSpPr>
-            <a:spLocks noGrp="1"/>
-          </p:cNvSpPr>
-          <p:nvPr>
-            <p:ph idx="1"/>
+                <a16:creationId xmlns:a16="http://schemas.microsoft.com/office/drawing/2014/main" id="{0C2D025D-D37A-4E82-80C2-9D0D91797CE5}"/>
+              </a:ext>
+            </a:extLst>
+          </p:cNvPr>
+          <p:cNvSpPr>
+            <a:spLocks noGrp="1"/>
+          </p:cNvSpPr>
+          <p:nvPr>
+            <p:ph sz="half" idx="1"/>
           </p:nvPr>
         </p:nvSpPr>
         <p:spPr/>
@@ -3799,21 +3832,72 @@
           <a:p>
             <a:r>
               <a:rPr lang="cs-CZ" dirty="0"/>
-              <a:t>Na stránce se nachází mapa, uživatel klikne na město kde chce podpořit nějaké sbírky, na </a:t>
-            </a:r>
-            <a:r>
-              <a:rPr lang="cs-CZ" dirty="0" err="1"/>
-              <a:t>slideru</a:t>
-            </a:r>
+              <a:t>Kalkulačku </a:t>
+            </a:r>
+          </a:p>
+          <a:p>
+            <a:pPr lvl="1"/>
             <a:r>
               <a:rPr lang="cs-CZ" dirty="0"/>
-              <a:t> si určí rozptyl – vzdálenost od bodu který označil – zobrazí se mu informace o veřejných sbírkách v tomto rozptylu (na základě místa, které uvedl zřizovatel té sbírky).</a:t>
-            </a:r>
-          </a:p>
-          <a:p>
+              <a:t>Uživatel označí víc sbírek, vloží výši částky kterou chce darovat.</a:t>
+            </a:r>
+          </a:p>
+          <a:p>
+            <a:pPr lvl="1"/>
             <a:r>
               <a:rPr lang="cs-CZ" dirty="0"/>
-              <a:t>Ten si vybere do které sbírky chce investovat, provede platbu na číslo účtu které se mu zobrazí v té tabulce. Tabulku může kdykoli zavřít pomocí tlačítka umístěného ve spodní části stránky.</a:t>
+              <a:t>Kalkulačka spočítá jeho daňový odpočet. </a:t>
+            </a:r>
+          </a:p>
+          <a:p>
+            <a:r>
+              <a:rPr lang="cs-CZ" dirty="0"/>
+              <a:t>Filtr na základě lokace zadané v textu, ne pomocí mapy.</a:t>
+            </a:r>
+          </a:p>
+          <a:p>
+            <a:endParaRPr lang="cs-CZ" dirty="0"/>
+          </a:p>
+        </p:txBody>
+      </p:sp>
+      <p:sp>
+        <p:nvSpPr>
+          <p:cNvPr id="4" name="Zástupný obsah 3">
+            <a:extLst>
+              <a:ext uri="{FF2B5EF4-FFF2-40B4-BE49-F238E27FC236}">
+                <a16:creationId xmlns:a16="http://schemas.microsoft.com/office/drawing/2014/main" id="{6779986D-63F5-4B35-92D1-A26F91A22DD4}"/>
+              </a:ext>
+            </a:extLst>
+          </p:cNvPr>
+          <p:cNvSpPr>
+            <a:spLocks noGrp="1"/>
+          </p:cNvSpPr>
+          <p:nvPr>
+            <p:ph sz="half" idx="2"/>
+          </p:nvPr>
+        </p:nvSpPr>
+        <p:spPr/>
+        <p:txBody>
+          <a:bodyPr/>
+          <a:lstStyle/>
+          <a:p>
+            <a:r>
+              <a:rPr lang="cs-CZ" dirty="0"/>
+              <a:t>Rozdělení částky mezi sbírky</a:t>
+            </a:r>
+          </a:p>
+          <a:p>
+            <a:pPr lvl="1"/>
+            <a:r>
+              <a:rPr lang="cs-CZ" dirty="0"/>
+              <a:t>Uživatel si označí více sbírek a vloží výši investované částky.</a:t>
+            </a:r>
+          </a:p>
+          <a:p>
+            <a:pPr lvl="1"/>
+            <a:r>
+              <a:rPr lang="cs-CZ" dirty="0"/>
+              <a:t>Určí si, zda chce rozdělit částku rovným dílem či v nějakém konkrétním poměru.</a:t>
             </a:r>
           </a:p>
         </p:txBody>
@@ -3821,7 +3905,7 @@
     </p:spTree>
     <p:extLst>
       <p:ext uri="{BB962C8B-B14F-4D97-AF65-F5344CB8AC3E}">
-        <p14:creationId xmlns:p14="http://schemas.microsoft.com/office/powerpoint/2010/main" val="1991961192"/>
+        <p14:creationId xmlns:p14="http://schemas.microsoft.com/office/powerpoint/2010/main" val="1730113276"/>
       </p:ext>
     </p:extLst>
   </p:cSld>
@@ -3853,7 +3937,7 @@
           <p:cNvPr id="2" name="Nadpis 1">
             <a:extLst>
               <a:ext uri="{FF2B5EF4-FFF2-40B4-BE49-F238E27FC236}">
-                <a16:creationId xmlns:a16="http://schemas.microsoft.com/office/drawing/2014/main" id="{0CE56654-10A3-462F-8D16-39E6E70BBCF4}"/>
+                <a16:creationId xmlns:a16="http://schemas.microsoft.com/office/drawing/2014/main" id="{A9D46359-8A14-4F80-BE20-4A425E599338}"/>
               </a:ext>
             </a:extLst>
           </p:cNvPr>
@@ -3871,7 +3955,7 @@
           <a:p>
             <a:r>
               <a:rPr lang="cs-CZ" b="1" dirty="0"/>
-              <a:t>Co jsme chtěli udělat a nestihli jsme to?</a:t>
+              <a:t>Co jsme udělali?</a:t>
             </a:r>
           </a:p>
         </p:txBody>
@@ -3881,7 +3965,7 @@
           <p:cNvPr id="3" name="Zástupný obsah 2">
             <a:extLst>
               <a:ext uri="{FF2B5EF4-FFF2-40B4-BE49-F238E27FC236}">
-                <a16:creationId xmlns:a16="http://schemas.microsoft.com/office/drawing/2014/main" id="{0C2D025D-D37A-4E82-80C2-9D0D91797CE5}"/>
+                <a16:creationId xmlns:a16="http://schemas.microsoft.com/office/drawing/2014/main" id="{5693BC0F-13B1-4DDA-90D2-F7A7531C02D8}"/>
               </a:ext>
             </a:extLst>
           </p:cNvPr>
@@ -3899,80 +3983,68 @@
           <a:p>
             <a:r>
               <a:rPr lang="cs-CZ" dirty="0"/>
-              <a:t>Kalkulačku </a:t>
+              <a:t>Mapu</a:t>
             </a:r>
           </a:p>
           <a:p>
             <a:pPr lvl="1"/>
             <a:r>
               <a:rPr lang="cs-CZ" dirty="0"/>
-              <a:t>Uživatel označí víc sbírek, vloží výši částky kterou chce darovat.</a:t>
+              <a:t>Kliknutím na místo se zobrazí sbírky v okruhu 25 km, tento rozptyl můžeme kdykoli zvýšit až do 200 km.</a:t>
             </a:r>
           </a:p>
           <a:p>
             <a:pPr lvl="1"/>
             <a:r>
               <a:rPr lang="cs-CZ" dirty="0"/>
-              <a:t>Kalkulačka spočítá jeho daňový odpočet. </a:t>
-            </a:r>
-          </a:p>
-          <a:p>
+              <a:t>Mezi těmito sbírkami se dá </a:t>
+            </a:r>
+            <a:r>
+              <a:rPr lang="cs-CZ" dirty="0" err="1"/>
+              <a:t>scrollovat</a:t>
+            </a:r>
             <a:r>
               <a:rPr lang="cs-CZ" dirty="0"/>
-              <a:t>Filtr na základě lokace zadané v textu, ne pomocí mapy.</a:t>
-            </a:r>
-          </a:p>
+              <a:t>.</a:t>
+            </a:r>
+          </a:p>
+          <a:p>
+            <a:r>
+              <a:rPr lang="cs-CZ" dirty="0"/>
+              <a:t>Tabulku se všemi sbírkami vedené v databázi KHK.</a:t>
+            </a:r>
+          </a:p>
+        </p:txBody>
+      </p:sp>
+      <p:sp>
+        <p:nvSpPr>
+          <p:cNvPr id="4" name="Zástupný obsah 3">
+            <a:extLst>
+              <a:ext uri="{FF2B5EF4-FFF2-40B4-BE49-F238E27FC236}">
+                <a16:creationId xmlns:a16="http://schemas.microsoft.com/office/drawing/2014/main" id="{C164C895-3F25-474C-9882-97438B2EABB0}"/>
+              </a:ext>
+            </a:extLst>
+          </p:cNvPr>
+          <p:cNvSpPr>
+            <a:spLocks noGrp="1"/>
+          </p:cNvSpPr>
+          <p:nvPr>
+            <p:ph sz="half" idx="2"/>
+          </p:nvPr>
+        </p:nvSpPr>
+        <p:spPr/>
+        <p:txBody>
+          <a:bodyPr/>
+          <a:lstStyle/>
           <a:p>
             <a:endParaRPr lang="cs-CZ" dirty="0"/>
-          </a:p>
-        </p:txBody>
-      </p:sp>
-      <p:sp>
-        <p:nvSpPr>
-          <p:cNvPr id="4" name="Zástupný obsah 3">
-            <a:extLst>
-              <a:ext uri="{FF2B5EF4-FFF2-40B4-BE49-F238E27FC236}">
-                <a16:creationId xmlns:a16="http://schemas.microsoft.com/office/drawing/2014/main" id="{6779986D-63F5-4B35-92D1-A26F91A22DD4}"/>
-              </a:ext>
-            </a:extLst>
-          </p:cNvPr>
-          <p:cNvSpPr>
-            <a:spLocks noGrp="1"/>
-          </p:cNvSpPr>
-          <p:nvPr>
-            <p:ph sz="half" idx="2"/>
-          </p:nvPr>
-        </p:nvSpPr>
-        <p:spPr/>
-        <p:txBody>
-          <a:bodyPr/>
-          <a:lstStyle/>
-          <a:p>
-            <a:r>
-              <a:rPr lang="cs-CZ" dirty="0"/>
-              <a:t>Rozdělení částky mezi sbírky</a:t>
-            </a:r>
-          </a:p>
-          <a:p>
-            <a:pPr lvl="1"/>
-            <a:r>
-              <a:rPr lang="cs-CZ" dirty="0"/>
-              <a:t>Uživatel si označí více sbírek a vloží výši investované částky.</a:t>
-            </a:r>
-          </a:p>
-          <a:p>
-            <a:pPr lvl="1"/>
-            <a:r>
-              <a:rPr lang="cs-CZ" dirty="0"/>
-              <a:t>Určí si, zda chce rozdělit částku rovným dílem či v nějakém konkrétním poměru.</a:t>
-            </a:r>
           </a:p>
         </p:txBody>
       </p:sp>
     </p:spTree>
     <p:extLst>
       <p:ext uri="{BB962C8B-B14F-4D97-AF65-F5344CB8AC3E}">
-        <p14:creationId xmlns:p14="http://schemas.microsoft.com/office/powerpoint/2010/main" val="1730113276"/>
+        <p14:creationId xmlns:p14="http://schemas.microsoft.com/office/powerpoint/2010/main" val="3827110325"/>
       </p:ext>
     </p:extLst>
   </p:cSld>
@@ -4004,7 +4076,7 @@
           <p:cNvPr id="2" name="Nadpis 1">
             <a:extLst>
               <a:ext uri="{FF2B5EF4-FFF2-40B4-BE49-F238E27FC236}">
-                <a16:creationId xmlns:a16="http://schemas.microsoft.com/office/drawing/2014/main" id="{A9D46359-8A14-4F80-BE20-4A425E599338}"/>
+                <a16:creationId xmlns:a16="http://schemas.microsoft.com/office/drawing/2014/main" id="{FF8458E7-B4DB-45E3-8F41-7FDD679146CD}"/>
               </a:ext>
             </a:extLst>
           </p:cNvPr>
@@ -4022,7 +4094,7 @@
           <a:p>
             <a:r>
               <a:rPr lang="cs-CZ" b="1" dirty="0"/>
-              <a:t>Co jsme udělali?</a:t>
+              <a:t>Data která jsme použili</a:t>
             </a:r>
           </a:p>
         </p:txBody>
@@ -4032,86 +4104,102 @@
           <p:cNvPr id="3" name="Zástupný obsah 2">
             <a:extLst>
               <a:ext uri="{FF2B5EF4-FFF2-40B4-BE49-F238E27FC236}">
-                <a16:creationId xmlns:a16="http://schemas.microsoft.com/office/drawing/2014/main" id="{5693BC0F-13B1-4DDA-90D2-F7A7531C02D8}"/>
-              </a:ext>
-            </a:extLst>
-          </p:cNvPr>
-          <p:cNvSpPr>
-            <a:spLocks noGrp="1"/>
-          </p:cNvSpPr>
-          <p:nvPr>
-            <p:ph sz="half" idx="1"/>
-          </p:nvPr>
-        </p:nvSpPr>
-        <p:spPr/>
-        <p:txBody>
-          <a:bodyPr/>
-          <a:lstStyle/>
+                <a16:creationId xmlns:a16="http://schemas.microsoft.com/office/drawing/2014/main" id="{702A47BC-6C2E-4091-B03F-4376F4A486AD}"/>
+              </a:ext>
+            </a:extLst>
+          </p:cNvPr>
+          <p:cNvSpPr>
+            <a:spLocks noGrp="1"/>
+          </p:cNvSpPr>
+          <p:nvPr>
+            <p:ph idx="1"/>
+          </p:nvPr>
+        </p:nvSpPr>
+        <p:spPr/>
+        <p:txBody>
+          <a:bodyPr>
+            <a:normAutofit fontScale="92500" lnSpcReduction="20000"/>
+          </a:bodyPr>
+          <a:lstStyle/>
+          <a:p>
+            <a:pPr marL="0" indent="0">
+              <a:buNone/>
+            </a:pPr>
+            <a:r>
+              <a:rPr lang="cs-CZ" sz="4000" dirty="0"/>
+              <a:t>Použili jsme data „</a:t>
+            </a:r>
+            <a:r>
+              <a:rPr lang="cs-CZ" sz="4000" dirty="0">
+                <a:hlinkClick r:id="rId2"/>
+              </a:rPr>
+              <a:t>Veřejné sbírky</a:t>
+            </a:r>
+            <a:r>
+              <a:rPr lang="cs-CZ" sz="4000" dirty="0"/>
+              <a:t>“</a:t>
+            </a:r>
+          </a:p>
           <a:p>
             <a:r>
               <a:rPr lang="cs-CZ" dirty="0"/>
-              <a:t>Mapu</a:t>
-            </a:r>
-          </a:p>
-          <a:p>
-            <a:pPr lvl="1"/>
+              <a:t>Název</a:t>
+            </a:r>
+          </a:p>
+          <a:p>
             <a:r>
               <a:rPr lang="cs-CZ" dirty="0"/>
-              <a:t>Kliknutím na místo se zobrazí sbírky v okruhu 25 km, tento rozptyl můžeme kdykoli zvýšit až do 200 km.</a:t>
-            </a:r>
-          </a:p>
-          <a:p>
-            <a:pPr lvl="1"/>
+              <a:t>IČO</a:t>
+            </a:r>
+          </a:p>
+          <a:p>
             <a:r>
               <a:rPr lang="cs-CZ" dirty="0"/>
-              <a:t>Mezi těmito sbírkami se dá </a:t>
-            </a:r>
-            <a:r>
-              <a:rPr lang="cs-CZ" dirty="0" err="1"/>
-              <a:t>scrollovat</a:t>
-            </a:r>
+              <a:t>Účel</a:t>
+            </a:r>
+          </a:p>
+          <a:p>
             <a:r>
               <a:rPr lang="cs-CZ" dirty="0"/>
-              <a:t>.</a:t>
+              <a:t>Číslo bankovního účtu</a:t>
             </a:r>
           </a:p>
           <a:p>
             <a:r>
               <a:rPr lang="cs-CZ" dirty="0"/>
-              <a:t>Tabulku se všemi sbírkami vedené v databázi KHK.</a:t>
-            </a:r>
-          </a:p>
-        </p:txBody>
-      </p:sp>
-      <p:sp>
-        <p:nvSpPr>
-          <p:cNvPr id="4" name="Zástupný obsah 3">
-            <a:extLst>
-              <a:ext uri="{FF2B5EF4-FFF2-40B4-BE49-F238E27FC236}">
-                <a16:creationId xmlns:a16="http://schemas.microsoft.com/office/drawing/2014/main" id="{C164C895-3F25-474C-9882-97438B2EABB0}"/>
-              </a:ext>
-            </a:extLst>
-          </p:cNvPr>
-          <p:cNvSpPr>
-            <a:spLocks noGrp="1"/>
-          </p:cNvSpPr>
-          <p:nvPr>
-            <p:ph sz="half" idx="2"/>
-          </p:nvPr>
-        </p:nvSpPr>
-        <p:spPr/>
-        <p:txBody>
-          <a:bodyPr/>
-          <a:lstStyle/>
-          <a:p>
-            <a:endParaRPr lang="cs-CZ" dirty="0"/>
+              <a:t>Webové stránky</a:t>
+            </a:r>
+          </a:p>
+          <a:p>
+            <a:r>
+              <a:rPr lang="cs-CZ" dirty="0"/>
+              <a:t>Název okresu</a:t>
+            </a:r>
+          </a:p>
+          <a:p>
+            <a:r>
+              <a:rPr lang="cs-CZ" dirty="0"/>
+              <a:t>Název obce</a:t>
+            </a:r>
+          </a:p>
+          <a:p>
+            <a:r>
+              <a:rPr lang="cs-CZ" dirty="0"/>
+              <a:t>Zeměpisná délka v souřadnicovém systému WGS84</a:t>
+            </a:r>
+          </a:p>
+          <a:p>
+            <a:r>
+              <a:rPr lang="cs-CZ" dirty="0"/>
+              <a:t>Zeměpisná šířka v souřadnicovém systému WGS84</a:t>
+            </a:r>
           </a:p>
         </p:txBody>
       </p:sp>
     </p:spTree>
     <p:extLst>
       <p:ext uri="{BB962C8B-B14F-4D97-AF65-F5344CB8AC3E}">
-        <p14:creationId xmlns:p14="http://schemas.microsoft.com/office/powerpoint/2010/main" val="3827110325"/>
+        <p14:creationId xmlns:p14="http://schemas.microsoft.com/office/powerpoint/2010/main" val="4159212478"/>
       </p:ext>
     </p:extLst>
   </p:cSld>
@@ -4143,7 +4231,7 @@
           <p:cNvPr id="2" name="Nadpis 1">
             <a:extLst>
               <a:ext uri="{FF2B5EF4-FFF2-40B4-BE49-F238E27FC236}">
-                <a16:creationId xmlns:a16="http://schemas.microsoft.com/office/drawing/2014/main" id="{FF8458E7-B4DB-45E3-8F41-7FDD679146CD}"/>
+                <a16:creationId xmlns:a16="http://schemas.microsoft.com/office/drawing/2014/main" id="{D46F1D29-B5B5-4BCB-BD8F-C76EFE2B664A}"/>
               </a:ext>
             </a:extLst>
           </p:cNvPr>
@@ -4159,114 +4247,57 @@
           <a:bodyPr/>
           <a:lstStyle/>
           <a:p>
-            <a:r>
-              <a:rPr lang="cs-CZ" b="1" dirty="0"/>
-              <a:t>Data které jsme použili</a:t>
-            </a:r>
-          </a:p>
-        </p:txBody>
-      </p:sp>
-      <p:sp>
-        <p:nvSpPr>
-          <p:cNvPr id="3" name="Zástupný obsah 2">
-            <a:extLst>
-              <a:ext uri="{FF2B5EF4-FFF2-40B4-BE49-F238E27FC236}">
-                <a16:creationId xmlns:a16="http://schemas.microsoft.com/office/drawing/2014/main" id="{702A47BC-6C2E-4091-B03F-4376F4A486AD}"/>
-              </a:ext>
-            </a:extLst>
-          </p:cNvPr>
-          <p:cNvSpPr>
-            <a:spLocks noGrp="1"/>
-          </p:cNvSpPr>
-          <p:nvPr>
-            <p:ph idx="1"/>
-          </p:nvPr>
-        </p:nvSpPr>
-        <p:spPr/>
-        <p:txBody>
-          <a:bodyPr>
-            <a:normAutofit fontScale="92500" lnSpcReduction="20000"/>
-          </a:bodyPr>
-          <a:lstStyle/>
-          <a:p>
-            <a:pPr marL="0" indent="0">
-              <a:buNone/>
-            </a:pPr>
-            <a:r>
-              <a:rPr lang="cs-CZ" sz="4000" dirty="0"/>
-              <a:t>Použili jsme data „</a:t>
-            </a:r>
-            <a:r>
-              <a:rPr lang="cs-CZ" sz="4000" dirty="0">
-                <a:hlinkClick r:id="rId2"/>
-              </a:rPr>
-              <a:t>Veřejné sbírky</a:t>
-            </a:r>
-            <a:r>
-              <a:rPr lang="cs-CZ" sz="4000" dirty="0"/>
-              <a:t>“</a:t>
-            </a:r>
-          </a:p>
-          <a:p>
-            <a:r>
-              <a:rPr lang="cs-CZ" dirty="0"/>
-              <a:t>Název</a:t>
-            </a:r>
-          </a:p>
-          <a:p>
-            <a:r>
-              <a:rPr lang="cs-CZ" dirty="0"/>
-              <a:t>IČO</a:t>
-            </a:r>
-          </a:p>
-          <a:p>
-            <a:r>
-              <a:rPr lang="cs-CZ" dirty="0"/>
-              <a:t>Účel</a:t>
-            </a:r>
-          </a:p>
-          <a:p>
-            <a:r>
-              <a:rPr lang="cs-CZ" dirty="0"/>
-              <a:t>Číslo bankovního účtu</a:t>
-            </a:r>
-          </a:p>
-          <a:p>
-            <a:r>
-              <a:rPr lang="cs-CZ" dirty="0"/>
-              <a:t>Webové stránky</a:t>
-            </a:r>
-          </a:p>
-          <a:p>
-            <a:r>
-              <a:rPr lang="cs-CZ" dirty="0"/>
-              <a:t>Název okresu</a:t>
-            </a:r>
-          </a:p>
-          <a:p>
-            <a:r>
-              <a:rPr lang="cs-CZ" dirty="0"/>
-              <a:t>Název obce</a:t>
-            </a:r>
-          </a:p>
-          <a:p>
-            <a:r>
-              <a:rPr lang="cs-CZ" dirty="0"/>
-              <a:t>Zeměpisná délka v souřadnicovém systému WGS84</a:t>
-            </a:r>
-          </a:p>
-          <a:p>
-            <a:r>
-              <a:rPr lang="cs-CZ" dirty="0"/>
-              <a:t>Zeměpisná šířka v souřadnicovém systému WGS84</a:t>
-            </a:r>
+            <a:endParaRPr lang="cs-CZ"/>
+          </a:p>
+        </p:txBody>
+      </p:sp>
+      <p:sp>
+        <p:nvSpPr>
+          <p:cNvPr id="3" name="Zástupný symbol obrázku 2">
+            <a:extLst>
+              <a:ext uri="{FF2B5EF4-FFF2-40B4-BE49-F238E27FC236}">
+                <a16:creationId xmlns:a16="http://schemas.microsoft.com/office/drawing/2014/main" id="{32FC06EF-018F-42A7-8B4B-A414B2B37801}"/>
+              </a:ext>
+            </a:extLst>
+          </p:cNvPr>
+          <p:cNvSpPr>
+            <a:spLocks noGrp="1"/>
+          </p:cNvSpPr>
+          <p:nvPr>
+            <p:ph type="pic" idx="1"/>
+          </p:nvPr>
+        </p:nvSpPr>
+        <p:spPr/>
+      </p:sp>
+      <p:sp>
+        <p:nvSpPr>
+          <p:cNvPr id="4" name="Zástupný text 3">
+            <a:extLst>
+              <a:ext uri="{FF2B5EF4-FFF2-40B4-BE49-F238E27FC236}">
+                <a16:creationId xmlns:a16="http://schemas.microsoft.com/office/drawing/2014/main" id="{A8996734-CC67-4885-951F-4EE5188CD3D7}"/>
+              </a:ext>
+            </a:extLst>
+          </p:cNvPr>
+          <p:cNvSpPr>
+            <a:spLocks noGrp="1"/>
+          </p:cNvSpPr>
+          <p:nvPr>
+            <p:ph type="body" sz="half" idx="2"/>
+          </p:nvPr>
+        </p:nvSpPr>
+        <p:spPr/>
+        <p:txBody>
+          <a:bodyPr/>
+          <a:lstStyle/>
+          <a:p>
+            <a:endParaRPr lang="cs-CZ"/>
           </a:p>
         </p:txBody>
       </p:sp>
     </p:spTree>
     <p:extLst>
       <p:ext uri="{BB962C8B-B14F-4D97-AF65-F5344CB8AC3E}">
-        <p14:creationId xmlns:p14="http://schemas.microsoft.com/office/powerpoint/2010/main" val="4159212478"/>
+        <p14:creationId xmlns:p14="http://schemas.microsoft.com/office/powerpoint/2010/main" val="872428004"/>
       </p:ext>
     </p:extLst>
   </p:cSld>

</xml_diff>